<commit_message>
created pbl template for beamer
</commit_message>
<xml_diff>
--- a/output/data_challenge_tgh.pptx
+++ b/output/data_challenge_tgh.pptx
@@ -5,7 +5,7 @@
     <p:sldMasterId id="2147483660" r:id="rId1"/>
   </p:sldMasterIdLst>
   <p:notesMasterIdLst>
-    <p:notesMasterId r:id="rId20"/>
+    <p:notesMasterId r:id="rId21"/>
   </p:notesMasterIdLst>
   <p:sldIdLst>
     <p:sldId id="257" r:id="rId2"/>
@@ -26,6 +26,7 @@
     <p:sldId id="386" r:id="rId17"/>
     <p:sldId id="387" r:id="rId18"/>
     <p:sldId id="389" r:id="rId19"/>
+    <p:sldId id="390" r:id="rId20"/>
   </p:sldIdLst>
   <p:sldSz cx="12192000" cy="6858000"/>
   <p:notesSz cx="6858000" cy="9144000"/>
@@ -247,7 +248,7 @@
           <a:p>
             <a:fld id="{D0F06106-3732-4EF8-9D8F-4190726BD2F0}" type="datetimeFigureOut">
               <a:rPr lang="nl-NL" smtClean="0"/>
-              <a:t>11-9-2018</a:t>
+              <a:t>18-9-2018</a:t>
             </a:fld>
             <a:endParaRPr lang="nl-NL"/>
           </a:p>
@@ -22489,6 +22490,98 @@
 </p:sld>
 </file>
 
+<file path=ppt/slides/slide19.xml><?xml version="1.0" encoding="utf-8"?>
+<p:sld xmlns:a="http://schemas.openxmlformats.org/drawingml/2006/main" xmlns:r="http://schemas.openxmlformats.org/officeDocument/2006/relationships" xmlns:p="http://schemas.openxmlformats.org/presentationml/2006/main">
+  <p:cSld>
+    <p:spTree>
+      <p:nvGrpSpPr>
+        <p:cNvPr id="1" name=""/>
+        <p:cNvGrpSpPr/>
+        <p:nvPr/>
+      </p:nvGrpSpPr>
+      <p:grpSpPr>
+        <a:xfrm>
+          <a:off x="0" y="0"/>
+          <a:ext cx="0" cy="0"/>
+          <a:chOff x="0" y="0"/>
+          <a:chExt cx="0" cy="0"/>
+        </a:xfrm>
+      </p:grpSpPr>
+      <p:sp>
+        <p:nvSpPr>
+          <p:cNvPr id="2" name="Title 1"/>
+          <p:cNvSpPr>
+            <a:spLocks noGrp="1"/>
+          </p:cNvSpPr>
+          <p:nvPr>
+            <p:ph type="title"/>
+          </p:nvPr>
+        </p:nvSpPr>
+        <p:spPr/>
+        <p:txBody>
+          <a:bodyPr/>
+          <a:lstStyle/>
+          <a:p>
+            <a:endParaRPr lang="nl-NL"/>
+          </a:p>
+        </p:txBody>
+      </p:sp>
+      <p:sp>
+        <p:nvSpPr>
+          <p:cNvPr id="3" name="Content Placeholder 2"/>
+          <p:cNvSpPr>
+            <a:spLocks noGrp="1"/>
+          </p:cNvSpPr>
+          <p:nvPr>
+            <p:ph idx="1"/>
+          </p:nvPr>
+        </p:nvSpPr>
+        <p:spPr/>
+        <p:txBody>
+          <a:bodyPr/>
+          <a:lstStyle/>
+          <a:p>
+            <a:endParaRPr lang="nl-NL"/>
+          </a:p>
+        </p:txBody>
+      </p:sp>
+      <p:sp>
+        <p:nvSpPr>
+          <p:cNvPr id="4" name="Slide Number Placeholder 3"/>
+          <p:cNvSpPr>
+            <a:spLocks noGrp="1"/>
+          </p:cNvSpPr>
+          <p:nvPr>
+            <p:ph type="sldNum" sz="quarter" idx="12"/>
+          </p:nvPr>
+        </p:nvSpPr>
+        <p:spPr/>
+        <p:txBody>
+          <a:bodyPr/>
+          <a:lstStyle/>
+          <a:p>
+            <a:fld id="{871B41AD-4089-4FF3-89EE-88DC6CFA2429}" type="slidenum">
+              <a:rPr lang="nl-NL" altLang="en-US" smtClean="0"/>
+              <a:pPr/>
+              <a:t>19</a:t>
+            </a:fld>
+            <a:endParaRPr lang="nl-NL" altLang="en-US"/>
+          </a:p>
+        </p:txBody>
+      </p:sp>
+    </p:spTree>
+    <p:extLst>
+      <p:ext uri="{BB962C8B-B14F-4D97-AF65-F5344CB8AC3E}">
+        <p14:creationId xmlns:p14="http://schemas.microsoft.com/office/powerpoint/2010/main" val="836119259"/>
+      </p:ext>
+    </p:extLst>
+  </p:cSld>
+  <p:clrMapOvr>
+    <a:masterClrMapping/>
+  </p:clrMapOvr>
+</p:sld>
+</file>
+
 <file path=ppt/slides/slide2.xml><?xml version="1.0" encoding="utf-8"?>
 <p:sld xmlns:a="http://schemas.openxmlformats.org/drawingml/2006/main" xmlns:r="http://schemas.openxmlformats.org/officeDocument/2006/relationships" xmlns:p="http://schemas.openxmlformats.org/presentationml/2006/main">
   <p:cSld>
@@ -22845,7 +22938,7 @@
           <a:graphicData uri="http://schemas.openxmlformats.org/presentationml/2006/ole">
             <mc:AlternateContent xmlns:mc="http://schemas.openxmlformats.org/markup-compatibility/2006">
               <mc:Choice xmlns:v="urn:schemas-microsoft-com:vml" Requires="v">
-                <p:oleObj spid="_x0000_s1050" name="Equation" r:id="rId4" imgW="126720" imgH="126720" progId="Equation.DSMT4">
+                <p:oleObj spid="_x0000_s1052" name="Equation" r:id="rId4" imgW="126720" imgH="126720" progId="Equation.DSMT4">
                   <p:embed/>
                 </p:oleObj>
               </mc:Choice>

</xml_diff>